<commit_message>
Update class 4 slides
</commit_message>
<xml_diff>
--- a/Collaterals/IntelMakersUniversity - class 4.pptx
+++ b/Collaterals/IntelMakersUniversity - class 4.pptx
@@ -6,10 +6,10 @@
     <p:sldMasterId id="2147483691" r:id="rId2"/>
   </p:sldMasterIdLst>
   <p:notesMasterIdLst>
-    <p:notesMasterId r:id="rId23"/>
+    <p:notesMasterId r:id="rId24"/>
   </p:notesMasterIdLst>
   <p:handoutMasterIdLst>
-    <p:handoutMasterId r:id="rId24"/>
+    <p:handoutMasterId r:id="rId25"/>
   </p:handoutMasterIdLst>
   <p:sldIdLst>
     <p:sldId id="318" r:id="rId3"/>
@@ -28,10 +28,11 @@
     <p:sldId id="360" r:id="rId16"/>
     <p:sldId id="361" r:id="rId17"/>
     <p:sldId id="362" r:id="rId18"/>
-    <p:sldId id="364" r:id="rId19"/>
-    <p:sldId id="365" r:id="rId20"/>
-    <p:sldId id="366" r:id="rId21"/>
-    <p:sldId id="294" r:id="rId22"/>
+    <p:sldId id="367" r:id="rId19"/>
+    <p:sldId id="364" r:id="rId20"/>
+    <p:sldId id="365" r:id="rId21"/>
+    <p:sldId id="366" r:id="rId22"/>
+    <p:sldId id="294" r:id="rId23"/>
   </p:sldIdLst>
   <p:sldSz cx="9144000" cy="5143500" type="screen16x9"/>
   <p:notesSz cx="6858000" cy="9144000"/>
@@ -261,7 +262,7 @@
                 <a:latin typeface="Intel Clear"/>
               </a:rPr>
               <a:pPr/>
-              <a:t>2/5/2020</a:t>
+              <a:t>2/10/2020</a:t>
             </a:fld>
             <a:endParaRPr lang="en-US" dirty="0">
               <a:latin typeface="Intel Clear"/>
@@ -441,7 +442,7 @@
             <a:fld id="{ED7FC5FE-6F0D-D34A-8EE6-C95B4F5F4DC8}" type="datetimeFigureOut">
               <a:rPr lang="en-US" smtClean="0"/>
               <a:pPr/>
-              <a:t>2/5/2020</a:t>
+              <a:t>2/10/2020</a:t>
             </a:fld>
             <a:endParaRPr lang="en-US" dirty="0"/>
           </a:p>
@@ -983,7 +984,7 @@
           <a:noFill/>
           <a:extLst>
             <a:ext uri="{909E8E84-426E-40dd-AFC4-6F175D3DCCD1}">
-              <a14:hiddenFill xmlns="" xmlns:a14="http://schemas.microsoft.com/office/drawing/2010/main">
+              <a14:hiddenFill xmlns:a14="http://schemas.microsoft.com/office/drawing/2010/main" xmlns="">
                 <a:solidFill>
                   <a:srgbClr val="FFFFFF"/>
                 </a:solidFill>
@@ -3857,7 +3858,7 @@
           <a:noFill/>
           <a:extLst>
             <a:ext uri="{909E8E84-426E-40dd-AFC4-6F175D3DCCD1}">
-              <a14:hiddenFill xmlns="" xmlns:a14="http://schemas.microsoft.com/office/drawing/2010/main">
+              <a14:hiddenFill xmlns:a14="http://schemas.microsoft.com/office/drawing/2010/main" xmlns="">
                 <a:solidFill>
                   <a:srgbClr val="FFFFFF"/>
                 </a:solidFill>
@@ -4026,7 +4027,7 @@
           <a:noFill/>
           <a:extLst>
             <a:ext uri="{909E8E84-426E-40dd-AFC4-6F175D3DCCD1}">
-              <a14:hiddenFill xmlns="" xmlns:a14="http://schemas.microsoft.com/office/drawing/2010/main">
+              <a14:hiddenFill xmlns:a14="http://schemas.microsoft.com/office/drawing/2010/main" xmlns="">
                 <a:solidFill>
                   <a:srgbClr val="FFFFFF"/>
                 </a:solidFill>
@@ -4421,7 +4422,7 @@
           <a:noFill/>
           <a:extLst>
             <a:ext uri="{909E8E84-426E-40dd-AFC4-6F175D3DCCD1}">
-              <a14:hiddenFill xmlns="" xmlns:a14="http://schemas.microsoft.com/office/drawing/2010/main">
+              <a14:hiddenFill xmlns:a14="http://schemas.microsoft.com/office/drawing/2010/main" xmlns="">
                 <a:solidFill>
                   <a:srgbClr val="FFFFFF"/>
                 </a:solidFill>
@@ -4724,7 +4725,7 @@
           <a:noFill/>
           <a:extLst>
             <a:ext uri="{909E8E84-426E-40dd-AFC4-6F175D3DCCD1}">
-              <a14:hiddenFill xmlns="" xmlns:a14="http://schemas.microsoft.com/office/drawing/2010/main">
+              <a14:hiddenFill xmlns:a14="http://schemas.microsoft.com/office/drawing/2010/main" xmlns="">
                 <a:solidFill>
                   <a:srgbClr val="FFFFFF"/>
                 </a:solidFill>
@@ -5060,7 +5061,7 @@
           <a:noFill/>
           <a:extLst>
             <a:ext uri="{909E8E84-426E-40dd-AFC4-6F175D3DCCD1}">
-              <a14:hiddenFill xmlns="" xmlns:a14="http://schemas.microsoft.com/office/drawing/2010/main">
+              <a14:hiddenFill xmlns:a14="http://schemas.microsoft.com/office/drawing/2010/main" xmlns="">
                 <a:solidFill>
                   <a:srgbClr val="FFFFFF"/>
                 </a:solidFill>
@@ -9276,7 +9277,7 @@
           <a:noFill/>
           <a:extLst>
             <a:ext uri="{909E8E84-426E-40dd-AFC4-6F175D3DCCD1}">
-              <a14:hiddenFill xmlns="" xmlns:a14="http://schemas.microsoft.com/office/drawing/2010/main">
+              <a14:hiddenFill xmlns:a14="http://schemas.microsoft.com/office/drawing/2010/main" xmlns="">
                 <a:solidFill>
                   <a:srgbClr val="FFFFFF"/>
                 </a:solidFill>
@@ -9520,7 +9521,7 @@
           <a:noFill/>
           <a:extLst>
             <a:ext uri="{909E8E84-426E-40dd-AFC4-6F175D3DCCD1}">
-              <a14:hiddenFill xmlns="" xmlns:a14="http://schemas.microsoft.com/office/drawing/2010/main">
+              <a14:hiddenFill xmlns:a14="http://schemas.microsoft.com/office/drawing/2010/main" xmlns="">
                 <a:solidFill>
                   <a:srgbClr val="FFFFFF"/>
                 </a:solidFill>
@@ -10945,7 +10946,7 @@
           <a:noFill/>
           <a:extLst>
             <a:ext uri="{909E8E84-426E-40dd-AFC4-6F175D3DCCD1}">
-              <a14:hiddenFill xmlns="" xmlns:a14="http://schemas.microsoft.com/office/drawing/2010/main">
+              <a14:hiddenFill xmlns:a14="http://schemas.microsoft.com/office/drawing/2010/main" xmlns="">
                 <a:solidFill>
                   <a:srgbClr val="FFFFFF"/>
                 </a:solidFill>
@@ -11562,7 +11563,7 @@
           <a:noFill/>
           <a:extLst>
             <a:ext uri="{909E8E84-426E-40dd-AFC4-6F175D3DCCD1}">
-              <a14:hiddenFill xmlns="" xmlns:a14="http://schemas.microsoft.com/office/drawing/2010/main">
+              <a14:hiddenFill xmlns:a14="http://schemas.microsoft.com/office/drawing/2010/main" xmlns="">
                 <a:solidFill>
                   <a:srgbClr val="FFFFFF"/>
                 </a:solidFill>
@@ -13894,6 +13895,7 @@
             <a:r>
               <a:rPr lang="en-US" b="1" dirty="0">
                 <a:sym typeface="Wingdings" panose="05000000000000000000" pitchFamily="2" charset="2"/>
+                <a:hlinkClick r:id="rId2"/>
               </a:rPr>
               <a:t>http://esp32</a:t>
             </a:r>
@@ -13903,15 +13905,51 @@
                   <a:srgbClr val="FFFF00"/>
                 </a:highlight>
                 <a:sym typeface="Wingdings" panose="05000000000000000000" pitchFamily="2" charset="2"/>
+                <a:hlinkClick r:id="rId2"/>
               </a:rPr>
               <a:t>.local</a:t>
             </a:r>
+            <a:r>
+              <a:rPr lang="en-US" b="1" dirty="0">
+                <a:sym typeface="Wingdings" panose="05000000000000000000" pitchFamily="2" charset="2"/>
+                <a:hlinkClick r:id="rId2"/>
+              </a:rPr>
+              <a:t>/</a:t>
+            </a:r>
+            <a:endParaRPr lang="en-US" b="1" dirty="0">
+              <a:sym typeface="Wingdings" panose="05000000000000000000" pitchFamily="2" charset="2"/>
+            </a:endParaRPr>
+          </a:p>
+          <a:p>
+            <a:pPr marL="511175" lvl="1" indent="-285750">
+              <a:buFont typeface="Arial" panose="020B0604020202020204" pitchFamily="34" charset="0"/>
+              <a:buChar char="•"/>
+            </a:pPr>
             <a:r>
               <a:rPr lang="en-US" b="1" dirty="0">
                 <a:sym typeface="Wingdings" panose="05000000000000000000" pitchFamily="2" charset="2"/>
               </a:rPr>
-              <a:t>/</a:t>
-            </a:r>
+              <a:t>No MDNS support - </a:t>
+            </a:r>
+            <a:r>
+              <a:rPr lang="en-US" b="1" dirty="0">
+                <a:sym typeface="Wingdings" panose="05000000000000000000" pitchFamily="2" charset="2"/>
+                <a:hlinkClick r:id="rId3"/>
+              </a:rPr>
+              <a:t>http://192.168.14.1/</a:t>
+            </a:r>
+            <a:r>
+              <a:rPr lang="en-US" b="1" dirty="0">
+                <a:sym typeface="Wingdings" panose="05000000000000000000" pitchFamily="2" charset="2"/>
+              </a:rPr>
+              <a:t> (just an example IP)</a:t>
+            </a:r>
+          </a:p>
+          <a:p>
+            <a:pPr marL="511175" lvl="1" indent="-285750">
+              <a:buFont typeface="Arial" panose="020B0604020202020204" pitchFamily="34" charset="0"/>
+              <a:buChar char="•"/>
+            </a:pPr>
             <a:endParaRPr lang="en-US" dirty="0"/>
           </a:p>
         </p:txBody>
@@ -13931,14 +13969,14 @@
           <p:nvPr/>
         </p:nvPicPr>
         <p:blipFill>
-          <a:blip r:embed="rId2"/>
+          <a:blip r:embed="rId4"/>
           <a:stretch>
             <a:fillRect/>
           </a:stretch>
         </p:blipFill>
         <p:spPr>
           <a:xfrm>
-            <a:off x="3771516" y="2971047"/>
+            <a:off x="4158866" y="2680040"/>
             <a:ext cx="4134062" cy="1441524"/>
           </a:xfrm>
           <a:prstGeom prst="rect">
@@ -14003,7 +14041,7 @@
           <p:cNvPr id="2" name="Slide Number Placeholder 1">
             <a:extLst>
               <a:ext uri="{FF2B5EF4-FFF2-40B4-BE49-F238E27FC236}">
-                <a16:creationId xmlns:a16="http://schemas.microsoft.com/office/drawing/2014/main" id="{17744C99-9A24-4D6F-8D3C-A4CB41E876CA}"/>
+                <a16:creationId xmlns:a16="http://schemas.microsoft.com/office/drawing/2014/main" id="{B1FF6DCD-B39F-48CD-83C3-B2F86A1E1258}"/>
               </a:ext>
             </a:extLst>
           </p:cNvPr>
@@ -14030,10 +14068,10 @@
       </p:sp>
       <p:sp>
         <p:nvSpPr>
-          <p:cNvPr id="4" name="Content Placeholder 3">
+          <p:cNvPr id="3" name="Title 2">
             <a:extLst>
               <a:ext uri="{FF2B5EF4-FFF2-40B4-BE49-F238E27FC236}">
-                <a16:creationId xmlns:a16="http://schemas.microsoft.com/office/drawing/2014/main" id="{0DA5B5C6-365A-4798-8EE3-9AAC1659E9D7}"/>
+                <a16:creationId xmlns:a16="http://schemas.microsoft.com/office/drawing/2014/main" id="{479C472F-5734-47D5-8B13-8377293992A0}"/>
               </a:ext>
             </a:extLst>
           </p:cNvPr>
@@ -14041,111 +14079,36 @@
             <a:spLocks noGrp="1"/>
           </p:cNvSpPr>
           <p:nvPr>
-            <p:ph sz="quarter" idx="13"/>
+            <p:ph type="title"/>
           </p:nvPr>
         </p:nvSpPr>
         <p:spPr>
           <a:xfrm>
-            <a:off x="455613" y="715109"/>
-            <a:ext cx="8228012" cy="3914042"/>
+            <a:off x="457200" y="143748"/>
+            <a:ext cx="8229600" cy="370602"/>
           </a:xfrm>
         </p:spPr>
         <p:txBody>
           <a:bodyPr/>
           <a:lstStyle/>
           <a:p>
-            <a:pPr marL="285750" indent="-285750">
-              <a:spcBef>
-                <a:spcPts val="600"/>
-              </a:spcBef>
-              <a:buFont typeface="Arial" panose="020B0604020202020204" pitchFamily="34" charset="0"/>
-              <a:buChar char="•"/>
-            </a:pPr>
-            <a:r>
-              <a:rPr lang="en-US" dirty="0"/>
-              <a:t>Protocol developed by </a:t>
+            <a:r>
+              <a:rPr lang="en-US" dirty="0"/>
+              <a:t>No </a:t>
             </a:r>
             <a:r>
               <a:rPr lang="en-US" dirty="0" err="1"/>
-              <a:t>Espressif</a:t>
-            </a:r>
-            <a:endParaRPr lang="en-US" dirty="0"/>
-          </a:p>
-          <a:p>
-            <a:pPr marL="285750" indent="-285750">
-              <a:spcBef>
-                <a:spcPts val="600"/>
-              </a:spcBef>
-              <a:buFont typeface="Arial" panose="020B0604020202020204" pitchFamily="34" charset="0"/>
-              <a:buChar char="•"/>
-            </a:pPr>
-            <a:r>
-              <a:rPr lang="en-US" dirty="0"/>
-              <a:t>Enables multiple devices to communicate without using Wi-Fi</a:t>
-            </a:r>
-          </a:p>
-          <a:p>
-            <a:pPr marL="285750" indent="-285750">
-              <a:spcBef>
-                <a:spcPts val="600"/>
-              </a:spcBef>
-              <a:buFont typeface="Arial" panose="020B0604020202020204" pitchFamily="34" charset="0"/>
-              <a:buChar char="•"/>
-            </a:pPr>
-            <a:r>
-              <a:rPr lang="en-US" dirty="0"/>
-              <a:t>Low-power 2.4GHz wireless connectivity</a:t>
-            </a:r>
-          </a:p>
-          <a:p>
-            <a:pPr marL="285750" indent="-285750">
-              <a:spcBef>
-                <a:spcPts val="600"/>
-              </a:spcBef>
-              <a:buFont typeface="Arial" panose="020B0604020202020204" pitchFamily="34" charset="0"/>
-              <a:buChar char="•"/>
-            </a:pPr>
-            <a:r>
-              <a:rPr lang="en-US" dirty="0"/>
-              <a:t>Encrypted and unencrypted unicast communication</a:t>
-            </a:r>
-          </a:p>
-          <a:p>
-            <a:pPr marL="285750" indent="-285750">
-              <a:spcBef>
-                <a:spcPts val="600"/>
-              </a:spcBef>
-              <a:buFont typeface="Arial" panose="020B0604020202020204" pitchFamily="34" charset="0"/>
-              <a:buChar char="•"/>
-            </a:pPr>
-            <a:r>
-              <a:rPr lang="en-US" dirty="0"/>
-              <a:t>Up to 250-byte payload can be carried</a:t>
-            </a:r>
-          </a:p>
-          <a:p>
-            <a:pPr marL="285750" indent="-285750">
-              <a:spcBef>
-                <a:spcPts val="600"/>
-              </a:spcBef>
-              <a:buFont typeface="Arial" panose="020B0604020202020204" pitchFamily="34" charset="0"/>
-              <a:buChar char="•"/>
-            </a:pPr>
-            <a:r>
-              <a:rPr lang="en-US" dirty="0"/>
-              <a:t>10 encrypted peers at the most (STA mode), 6 for </a:t>
-            </a:r>
-            <a:r>
-              <a:rPr lang="en-US" dirty="0" err="1"/>
-              <a:t>SoftAP</a:t>
-            </a:r>
-            <a:r>
-              <a:rPr lang="en-US" dirty="0"/>
-              <a:t> or STA + </a:t>
-            </a:r>
-            <a:r>
-              <a:rPr lang="en-US" dirty="0" err="1"/>
-              <a:t>SoftAP</a:t>
+              <a:t>mdns</a:t>
+            </a:r>
+            <a:r>
+              <a:rPr lang="en-US" dirty="0"/>
+              <a:t> on Android so… (buy an iPhone </a:t>
+            </a:r>
+            <a:r>
+              <a:rPr lang="en-US" dirty="0">
+                <a:sym typeface="Wingdings" panose="05000000000000000000" pitchFamily="2" charset="2"/>
+              </a:rPr>
+              <a:t> or)</a:t>
             </a:r>
             <a:endParaRPr lang="en-US" dirty="0"/>
           </a:p>
@@ -14153,10 +14116,10 @@
       </p:sp>
       <p:pic>
         <p:nvPicPr>
-          <p:cNvPr id="5" name="Picture 4">
+          <p:cNvPr id="6" name="Picture 5" descr="A screen shot of a smart phone&#10;&#10;Description automatically generated">
             <a:extLst>
               <a:ext uri="{FF2B5EF4-FFF2-40B4-BE49-F238E27FC236}">
-                <a16:creationId xmlns:a16="http://schemas.microsoft.com/office/drawing/2014/main" id="{E2EC1960-0710-42C1-8B0A-4665A64FE647}"/>
+                <a16:creationId xmlns:a16="http://schemas.microsoft.com/office/drawing/2014/main" id="{17E44084-A604-4F48-BBF2-DCC799E8AD28}"/>
               </a:ext>
             </a:extLst>
           </p:cNvPr>
@@ -14173,8 +14136,8 @@
         </p:blipFill>
         <p:spPr>
           <a:xfrm>
-            <a:off x="3393701" y="41890"/>
-            <a:ext cx="2351836" cy="673219"/>
+            <a:off x="7062853" y="628649"/>
+            <a:ext cx="1752598" cy="3797297"/>
           </a:xfrm>
           <a:prstGeom prst="rect">
             <a:avLst/>
@@ -14183,10 +14146,10 @@
       </p:pic>
       <p:pic>
         <p:nvPicPr>
-          <p:cNvPr id="8" name="Picture 7">
+          <p:cNvPr id="8" name="Picture 7" descr="A screenshot of a cell phone&#10;&#10;Description automatically generated">
             <a:extLst>
               <a:ext uri="{FF2B5EF4-FFF2-40B4-BE49-F238E27FC236}">
-                <a16:creationId xmlns:a16="http://schemas.microsoft.com/office/drawing/2014/main" id="{17C7A402-78E7-4D22-801D-EB951135DBE9}"/>
+                <a16:creationId xmlns:a16="http://schemas.microsoft.com/office/drawing/2014/main" id="{15FD725A-C0D2-4DCF-BAF3-F10462A671C6}"/>
               </a:ext>
             </a:extLst>
           </p:cNvPr>
@@ -14203,28 +14166,207 @@
         </p:blipFill>
         <p:spPr>
           <a:xfrm>
-            <a:off x="2743200" y="2795652"/>
-            <a:ext cx="2617365" cy="1876113"/>
+            <a:off x="2689639" y="628649"/>
+            <a:ext cx="1752599" cy="3797300"/>
           </a:xfrm>
           <a:prstGeom prst="rect">
             <a:avLst/>
           </a:prstGeom>
+        </p:spPr>
+      </p:pic>
+      <p:pic>
+        <p:nvPicPr>
+          <p:cNvPr id="10" name="Picture 9" descr="A screenshot of a cell phone&#10;&#10;Description automatically generated">
+            <a:extLst>
+              <a:ext uri="{FF2B5EF4-FFF2-40B4-BE49-F238E27FC236}">
+                <a16:creationId xmlns:a16="http://schemas.microsoft.com/office/drawing/2014/main" id="{3D050D2A-767E-4567-B538-45961B0377E4}"/>
+              </a:ext>
+            </a:extLst>
+          </p:cNvPr>
+          <p:cNvPicPr>
+            <a:picLocks noChangeAspect="1"/>
+          </p:cNvPicPr>
+          <p:nvPr/>
+        </p:nvPicPr>
+        <p:blipFill>
+          <a:blip r:embed="rId4"/>
+          <a:stretch>
+            <a:fillRect/>
+          </a:stretch>
+        </p:blipFill>
+        <p:spPr>
+          <a:xfrm>
+            <a:off x="4801991" y="628646"/>
+            <a:ext cx="1752600" cy="3797300"/>
+          </a:xfrm>
+          <a:prstGeom prst="rect">
+            <a:avLst/>
+          </a:prstGeom>
+        </p:spPr>
+      </p:pic>
+      <p:pic>
+        <p:nvPicPr>
+          <p:cNvPr id="12" name="Picture 11" descr="A screenshot of a cell phone&#10;&#10;Description automatically generated">
+            <a:extLst>
+              <a:ext uri="{FF2B5EF4-FFF2-40B4-BE49-F238E27FC236}">
+                <a16:creationId xmlns:a16="http://schemas.microsoft.com/office/drawing/2014/main" id="{DE326BE5-D38A-4794-92E7-3313E7434CAC}"/>
+              </a:ext>
+            </a:extLst>
+          </p:cNvPr>
+          <p:cNvPicPr>
+            <a:picLocks noChangeAspect="1"/>
+          </p:cNvPicPr>
+          <p:nvPr/>
+        </p:nvPicPr>
+        <p:blipFill>
+          <a:blip r:embed="rId5"/>
+          <a:stretch>
+            <a:fillRect/>
+          </a:stretch>
+        </p:blipFill>
+        <p:spPr>
+          <a:xfrm>
+            <a:off x="428776" y="628646"/>
+            <a:ext cx="1752600" cy="3797300"/>
+          </a:xfrm>
+          <a:prstGeom prst="rect">
+            <a:avLst/>
+          </a:prstGeom>
+        </p:spPr>
+      </p:pic>
+      <p:cxnSp>
+        <p:nvCxnSpPr>
+          <p:cNvPr id="14" name="Straight Arrow Connector 13">
+            <a:extLst>
+              <a:ext uri="{FF2B5EF4-FFF2-40B4-BE49-F238E27FC236}">
+                <a16:creationId xmlns:a16="http://schemas.microsoft.com/office/drawing/2014/main" id="{525D55CA-5DF0-439A-8E29-2FBFBE89680A}"/>
+              </a:ext>
+            </a:extLst>
+          </p:cNvPr>
+          <p:cNvCxnSpPr/>
+          <p:nvPr/>
+        </p:nvCxnSpPr>
+        <p:spPr>
+          <a:xfrm flipH="1">
+            <a:off x="6553200" y="3067050"/>
+            <a:ext cx="1562100" cy="0"/>
+          </a:xfrm>
+          <a:prstGeom prst="straightConnector1">
+            <a:avLst/>
+          </a:prstGeom>
           <a:ln>
-            <a:noFill/>
+            <a:solidFill>
+              <a:schemeClr val="tx2"/>
+            </a:solidFill>
+            <a:tailEnd type="triangle"/>
           </a:ln>
-          <a:effectLst>
-            <a:outerShdw blurRad="292100" dist="139700" dir="2700000" algn="tl" rotWithShape="0">
-              <a:srgbClr val="333333">
-                <a:alpha val="65000"/>
-              </a:srgbClr>
-            </a:outerShdw>
-          </a:effectLst>
-        </p:spPr>
-      </p:pic>
+          <a:effectLst/>
+        </p:spPr>
+        <p:style>
+          <a:lnRef idx="2">
+            <a:schemeClr val="accent1"/>
+          </a:lnRef>
+          <a:fillRef idx="0">
+            <a:schemeClr val="accent1"/>
+          </a:fillRef>
+          <a:effectRef idx="1">
+            <a:schemeClr val="accent1"/>
+          </a:effectRef>
+          <a:fontRef idx="minor">
+            <a:schemeClr val="tx1"/>
+          </a:fontRef>
+        </p:style>
+      </p:cxnSp>
+      <p:cxnSp>
+        <p:nvCxnSpPr>
+          <p:cNvPr id="16" name="Straight Arrow Connector 15">
+            <a:extLst>
+              <a:ext uri="{FF2B5EF4-FFF2-40B4-BE49-F238E27FC236}">
+                <a16:creationId xmlns:a16="http://schemas.microsoft.com/office/drawing/2014/main" id="{3C18FD72-2A52-4A14-8E3C-1F1D218203F2}"/>
+              </a:ext>
+            </a:extLst>
+          </p:cNvPr>
+          <p:cNvCxnSpPr/>
+          <p:nvPr/>
+        </p:nvCxnSpPr>
+        <p:spPr>
+          <a:xfrm flipH="1" flipV="1">
+            <a:off x="4286250" y="1295400"/>
+            <a:ext cx="812800" cy="1771650"/>
+          </a:xfrm>
+          <a:prstGeom prst="straightConnector1">
+            <a:avLst/>
+          </a:prstGeom>
+          <a:ln>
+            <a:solidFill>
+              <a:schemeClr val="tx2"/>
+            </a:solidFill>
+            <a:tailEnd type="triangle"/>
+          </a:ln>
+          <a:effectLst/>
+        </p:spPr>
+        <p:style>
+          <a:lnRef idx="2">
+            <a:schemeClr val="accent1"/>
+          </a:lnRef>
+          <a:fillRef idx="0">
+            <a:schemeClr val="accent1"/>
+          </a:fillRef>
+          <a:effectRef idx="1">
+            <a:schemeClr val="accent1"/>
+          </a:effectRef>
+          <a:fontRef idx="minor">
+            <a:schemeClr val="tx1"/>
+          </a:fontRef>
+        </p:style>
+      </p:cxnSp>
+      <p:cxnSp>
+        <p:nvCxnSpPr>
+          <p:cNvPr id="18" name="Straight Arrow Connector 17">
+            <a:extLst>
+              <a:ext uri="{FF2B5EF4-FFF2-40B4-BE49-F238E27FC236}">
+                <a16:creationId xmlns:a16="http://schemas.microsoft.com/office/drawing/2014/main" id="{115654D4-1310-431E-A6BB-68D66EE272E6}"/>
+              </a:ext>
+            </a:extLst>
+          </p:cNvPr>
+          <p:cNvCxnSpPr/>
+          <p:nvPr/>
+        </p:nvCxnSpPr>
+        <p:spPr>
+          <a:xfrm flipH="1" flipV="1">
+            <a:off x="2181376" y="2774950"/>
+            <a:ext cx="1571474" cy="1003300"/>
+          </a:xfrm>
+          <a:prstGeom prst="straightConnector1">
+            <a:avLst/>
+          </a:prstGeom>
+          <a:ln>
+            <a:solidFill>
+              <a:schemeClr val="tx2"/>
+            </a:solidFill>
+            <a:tailEnd type="triangle"/>
+          </a:ln>
+          <a:effectLst/>
+        </p:spPr>
+        <p:style>
+          <a:lnRef idx="2">
+            <a:schemeClr val="accent1"/>
+          </a:lnRef>
+          <a:fillRef idx="0">
+            <a:schemeClr val="accent1"/>
+          </a:fillRef>
+          <a:effectRef idx="1">
+            <a:schemeClr val="accent1"/>
+          </a:effectRef>
+          <a:fontRef idx="minor">
+            <a:schemeClr val="tx1"/>
+          </a:fontRef>
+        </p:style>
+      </p:cxnSp>
     </p:spTree>
     <p:extLst>
       <p:ext uri="{BB962C8B-B14F-4D97-AF65-F5344CB8AC3E}">
-        <p14:creationId xmlns:p14="http://schemas.microsoft.com/office/powerpoint/2010/main" val="3970351120"/>
+        <p14:creationId xmlns:p14="http://schemas.microsoft.com/office/powerpoint/2010/main" val="716925225"/>
       </p:ext>
     </p:extLst>
   </p:cSld>
@@ -14295,48 +14437,6 @@
       </p:sp>
       <p:sp>
         <p:nvSpPr>
-          <p:cNvPr id="3" name="Title 2">
-            <a:extLst>
-              <a:ext uri="{FF2B5EF4-FFF2-40B4-BE49-F238E27FC236}">
-                <a16:creationId xmlns:a16="http://schemas.microsoft.com/office/drawing/2014/main" id="{DFCD3F10-262A-49AA-92F3-A28E2073C0CF}"/>
-              </a:ext>
-            </a:extLst>
-          </p:cNvPr>
-          <p:cNvSpPr>
-            <a:spLocks noGrp="1"/>
-          </p:cNvSpPr>
-          <p:nvPr>
-            <p:ph type="title"/>
-          </p:nvPr>
-        </p:nvSpPr>
-        <p:spPr>
-          <a:xfrm>
-            <a:off x="455613" y="308848"/>
-            <a:ext cx="8229600" cy="379883"/>
-          </a:xfrm>
-        </p:spPr>
-        <p:txBody>
-          <a:bodyPr/>
-          <a:lstStyle/>
-          <a:p>
-            <a:pPr>
-              <a:spcBef>
-                <a:spcPts val="600"/>
-              </a:spcBef>
-            </a:pPr>
-            <a:r>
-              <a:rPr lang="en-US" sz="3600" dirty="0" err="1"/>
-              <a:t>Esp</a:t>
-            </a:r>
-            <a:r>
-              <a:rPr lang="en-US" sz="3600" dirty="0"/>
-              <a:t>-now </a:t>
-            </a:r>
-          </a:p>
-        </p:txBody>
-      </p:sp>
-      <p:sp>
-        <p:nvSpPr>
           <p:cNvPr id="4" name="Content Placeholder 3">
             <a:extLst>
               <a:ext uri="{FF2B5EF4-FFF2-40B4-BE49-F238E27FC236}">
@@ -14370,8 +14470,13 @@
             </a:pPr>
             <a:r>
               <a:rPr lang="en-US" dirty="0"/>
-              <a:t>Works with MAC address</a:t>
-            </a:r>
+              <a:t>Protocol developed by </a:t>
+            </a:r>
+            <a:r>
+              <a:rPr lang="en-US" dirty="0" err="1"/>
+              <a:t>Espressif</a:t>
+            </a:r>
+            <a:endParaRPr lang="en-US" dirty="0"/>
           </a:p>
           <a:p>
             <a:pPr marL="285750" indent="-285750">
@@ -14383,7 +14488,7 @@
             </a:pPr>
             <a:r>
               <a:rPr lang="en-US" dirty="0"/>
-              <a:t>Need to know the our MAC and the Peer’s</a:t>
+              <a:t>Enables multiple devices to communicate without using Wi-Fi</a:t>
             </a:r>
           </a:p>
           <a:p>
@@ -14396,7 +14501,7 @@
             </a:pPr>
             <a:r>
               <a:rPr lang="en-US" dirty="0"/>
-              <a:t>Initialize the protocol</a:t>
+              <a:t>Low-power 2.4GHz wireless connectivity</a:t>
             </a:r>
           </a:p>
           <a:p>
@@ -14409,7 +14514,7 @@
             </a:pPr>
             <a:r>
               <a:rPr lang="en-US" dirty="0"/>
-              <a:t>Register callback functions for send and receive</a:t>
+              <a:t>Encrypted and unencrypted unicast communication</a:t>
             </a:r>
           </a:p>
           <a:p>
@@ -14422,7 +14527,7 @@
             </a:pPr>
             <a:r>
               <a:rPr lang="en-US" dirty="0"/>
-              <a:t>Register peers</a:t>
+              <a:t>Up to 250-byte payload can be carried</a:t>
             </a:r>
           </a:p>
           <a:p>
@@ -14435,73 +14540,21 @@
             </a:pPr>
             <a:r>
               <a:rPr lang="en-US" dirty="0"/>
-              <a:t>Upon sending the send function will be called:</a:t>
-            </a:r>
-          </a:p>
-          <a:p>
-            <a:pPr marL="511175" lvl="1" indent="-285750">
-              <a:spcBef>
-                <a:spcPts val="600"/>
-              </a:spcBef>
-              <a:buFont typeface="Arial" panose="020B0604020202020204" pitchFamily="34" charset="0"/>
-              <a:buChar char="•"/>
-            </a:pPr>
-            <a:r>
-              <a:rPr lang="en-US" dirty="0"/>
-              <a:t>With status</a:t>
-            </a:r>
-          </a:p>
-          <a:p>
-            <a:pPr marL="511175" lvl="1" indent="-285750">
-              <a:spcBef>
-                <a:spcPts val="600"/>
-              </a:spcBef>
-              <a:buFont typeface="Arial" panose="020B0604020202020204" pitchFamily="34" charset="0"/>
-              <a:buChar char="•"/>
-            </a:pPr>
-            <a:r>
-              <a:rPr lang="en-US" dirty="0"/>
-              <a:t>With the MAC of the targeted peer</a:t>
-            </a:r>
-          </a:p>
-          <a:p>
-            <a:pPr marL="285750" indent="-285750">
-              <a:spcBef>
-                <a:spcPts val="600"/>
-              </a:spcBef>
-              <a:buFont typeface="Arial" panose="020B0604020202020204" pitchFamily="34" charset="0"/>
-              <a:buChar char="•"/>
-            </a:pPr>
-            <a:r>
-              <a:rPr lang="en-US" dirty="0"/>
-              <a:t>Upon receiving the receive function will be called:</a:t>
-            </a:r>
-          </a:p>
-          <a:p>
-            <a:pPr marL="511175" lvl="1" indent="-285750">
-              <a:spcBef>
-                <a:spcPts val="600"/>
-              </a:spcBef>
-              <a:buFont typeface="Arial" panose="020B0604020202020204" pitchFamily="34" charset="0"/>
-              <a:buChar char="•"/>
-            </a:pPr>
-            <a:r>
-              <a:rPr lang="en-US" dirty="0"/>
-              <a:t>With the MAC of the sender</a:t>
-            </a:r>
-          </a:p>
-          <a:p>
-            <a:pPr marL="511175" lvl="1" indent="-285750">
-              <a:spcBef>
-                <a:spcPts val="600"/>
-              </a:spcBef>
-              <a:buFont typeface="Arial" panose="020B0604020202020204" pitchFamily="34" charset="0"/>
-              <a:buChar char="•"/>
-            </a:pPr>
-            <a:r>
-              <a:rPr lang="en-US" dirty="0"/>
-              <a:t>With the received data </a:t>
-            </a:r>
+              <a:t>10 encrypted peers at the most (STA mode), 6 for </a:t>
+            </a:r>
+            <a:r>
+              <a:rPr lang="en-US" dirty="0" err="1"/>
+              <a:t>SoftAP</a:t>
+            </a:r>
+            <a:r>
+              <a:rPr lang="en-US" dirty="0"/>
+              <a:t> or STA + </a:t>
+            </a:r>
+            <a:r>
+              <a:rPr lang="en-US" dirty="0" err="1"/>
+              <a:t>SoftAP</a:t>
+            </a:r>
+            <a:endParaRPr lang="en-US" dirty="0"/>
           </a:p>
         </p:txBody>
       </p:sp>
@@ -14510,7 +14563,7 @@
           <p:cNvPr id="5" name="Picture 4">
             <a:extLst>
               <a:ext uri="{FF2B5EF4-FFF2-40B4-BE49-F238E27FC236}">
-                <a16:creationId xmlns:a16="http://schemas.microsoft.com/office/drawing/2014/main" id="{E0CD740F-035D-419D-923E-4431F19446F0}"/>
+                <a16:creationId xmlns:a16="http://schemas.microsoft.com/office/drawing/2014/main" id="{E2EC1960-0710-42C1-8B0A-4665A64FE647}"/>
               </a:ext>
             </a:extLst>
           </p:cNvPr>
@@ -14527,30 +14580,20 @@
         </p:blipFill>
         <p:spPr>
           <a:xfrm>
-            <a:off x="5412371" y="416145"/>
-            <a:ext cx="2762392" cy="558829"/>
+            <a:off x="3393701" y="41890"/>
+            <a:ext cx="2351836" cy="673219"/>
           </a:xfrm>
           <a:prstGeom prst="rect">
             <a:avLst/>
           </a:prstGeom>
-          <a:ln>
-            <a:noFill/>
-          </a:ln>
-          <a:effectLst>
-            <a:outerShdw blurRad="292100" dist="139700" dir="2700000" algn="tl" rotWithShape="0">
-              <a:srgbClr val="333333">
-                <a:alpha val="65000"/>
-              </a:srgbClr>
-            </a:outerShdw>
-          </a:effectLst>
         </p:spPr>
       </p:pic>
       <p:pic>
         <p:nvPicPr>
-          <p:cNvPr id="6" name="Picture 5">
+          <p:cNvPr id="8" name="Picture 7">
             <a:extLst>
               <a:ext uri="{FF2B5EF4-FFF2-40B4-BE49-F238E27FC236}">
-                <a16:creationId xmlns:a16="http://schemas.microsoft.com/office/drawing/2014/main" id="{63A27537-E429-4EEC-8B70-DC7BEE487116}"/>
+                <a16:creationId xmlns:a16="http://schemas.microsoft.com/office/drawing/2014/main" id="{17C7A402-78E7-4D22-801D-EB951135DBE9}"/>
               </a:ext>
             </a:extLst>
           </p:cNvPr>
@@ -14567,8 +14610,8 @@
         </p:blipFill>
         <p:spPr>
           <a:xfrm>
-            <a:off x="5159771" y="1094540"/>
-            <a:ext cx="3425162" cy="541629"/>
+            <a:off x="2743200" y="2795652"/>
+            <a:ext cx="2617365" cy="1876113"/>
           </a:xfrm>
           <a:prstGeom prst="rect">
             <a:avLst/>
@@ -14585,130 +14628,10 @@
           </a:effectLst>
         </p:spPr>
       </p:pic>
-      <p:pic>
-        <p:nvPicPr>
-          <p:cNvPr id="7" name="Picture 6">
-            <a:extLst>
-              <a:ext uri="{FF2B5EF4-FFF2-40B4-BE49-F238E27FC236}">
-                <a16:creationId xmlns:a16="http://schemas.microsoft.com/office/drawing/2014/main" id="{0EB74540-5EA9-4A02-8111-F55BC8B9176C}"/>
-              </a:ext>
-            </a:extLst>
-          </p:cNvPr>
-          <p:cNvPicPr>
-            <a:picLocks noChangeAspect="1"/>
-          </p:cNvPicPr>
-          <p:nvPr/>
-        </p:nvPicPr>
-        <p:blipFill>
-          <a:blip r:embed="rId4"/>
-          <a:stretch>
-            <a:fillRect/>
-          </a:stretch>
-        </p:blipFill>
-        <p:spPr>
-          <a:xfrm>
-            <a:off x="5935289" y="1717892"/>
-            <a:ext cx="2239474" cy="595416"/>
-          </a:xfrm>
-          <a:prstGeom prst="rect">
-            <a:avLst/>
-          </a:prstGeom>
-          <a:ln>
-            <a:noFill/>
-          </a:ln>
-          <a:effectLst>
-            <a:outerShdw blurRad="292100" dist="139700" dir="2700000" algn="tl" rotWithShape="0">
-              <a:srgbClr val="333333">
-                <a:alpha val="65000"/>
-              </a:srgbClr>
-            </a:outerShdw>
-          </a:effectLst>
-        </p:spPr>
-      </p:pic>
-      <p:pic>
-        <p:nvPicPr>
-          <p:cNvPr id="8" name="Picture 7">
-            <a:extLst>
-              <a:ext uri="{FF2B5EF4-FFF2-40B4-BE49-F238E27FC236}">
-                <a16:creationId xmlns:a16="http://schemas.microsoft.com/office/drawing/2014/main" id="{AF44AA83-D29E-4C69-BAF1-029E0D84F56B}"/>
-              </a:ext>
-            </a:extLst>
-          </p:cNvPr>
-          <p:cNvPicPr>
-            <a:picLocks noChangeAspect="1"/>
-          </p:cNvPicPr>
-          <p:nvPr/>
-        </p:nvPicPr>
-        <p:blipFill>
-          <a:blip r:embed="rId5"/>
-          <a:stretch>
-            <a:fillRect/>
-          </a:stretch>
-        </p:blipFill>
-        <p:spPr>
-          <a:xfrm>
-            <a:off x="5637320" y="2473262"/>
-            <a:ext cx="3181387" cy="516185"/>
-          </a:xfrm>
-          <a:prstGeom prst="rect">
-            <a:avLst/>
-          </a:prstGeom>
-          <a:ln>
-            <a:noFill/>
-          </a:ln>
-          <a:effectLst>
-            <a:outerShdw blurRad="292100" dist="139700" dir="2700000" algn="tl" rotWithShape="0">
-              <a:srgbClr val="333333">
-                <a:alpha val="65000"/>
-              </a:srgbClr>
-            </a:outerShdw>
-          </a:effectLst>
-        </p:spPr>
-      </p:pic>
-      <p:pic>
-        <p:nvPicPr>
-          <p:cNvPr id="9" name="Picture 8">
-            <a:extLst>
-              <a:ext uri="{FF2B5EF4-FFF2-40B4-BE49-F238E27FC236}">
-                <a16:creationId xmlns:a16="http://schemas.microsoft.com/office/drawing/2014/main" id="{9BDDAFFD-B164-44D2-98CC-ECE3EA8C8AEA}"/>
-              </a:ext>
-            </a:extLst>
-          </p:cNvPr>
-          <p:cNvPicPr>
-            <a:picLocks noChangeAspect="1"/>
-          </p:cNvPicPr>
-          <p:nvPr/>
-        </p:nvPicPr>
-        <p:blipFill>
-          <a:blip r:embed="rId6"/>
-          <a:stretch>
-            <a:fillRect/>
-          </a:stretch>
-        </p:blipFill>
-        <p:spPr>
-          <a:xfrm>
-            <a:off x="4500883" y="3938389"/>
-            <a:ext cx="3673880" cy="484878"/>
-          </a:xfrm>
-          <a:prstGeom prst="rect">
-            <a:avLst/>
-          </a:prstGeom>
-          <a:ln>
-            <a:noFill/>
-          </a:ln>
-          <a:effectLst>
-            <a:outerShdw blurRad="292100" dist="139700" dir="2700000" algn="tl" rotWithShape="0">
-              <a:srgbClr val="333333">
-                <a:alpha val="65000"/>
-              </a:srgbClr>
-            </a:outerShdw>
-          </a:effectLst>
-        </p:spPr>
-      </p:pic>
     </p:spTree>
     <p:extLst>
       <p:ext uri="{BB962C8B-B14F-4D97-AF65-F5344CB8AC3E}">
-        <p14:creationId xmlns:p14="http://schemas.microsoft.com/office/powerpoint/2010/main" val="1910364947"/>
+        <p14:creationId xmlns:p14="http://schemas.microsoft.com/office/powerpoint/2010/main" val="3970351120"/>
       </p:ext>
     </p:extLst>
   </p:cSld>
@@ -14809,8 +14732,12 @@
               </a:spcBef>
             </a:pPr>
             <a:r>
+              <a:rPr lang="en-US" sz="3600" dirty="0" err="1"/>
+              <a:t>Esp</a:t>
+            </a:r>
+            <a:r>
               <a:rPr lang="en-US" sz="3600" dirty="0"/>
-              <a:t>Useful web services </a:t>
+              <a:t>-now </a:t>
             </a:r>
           </a:p>
         </p:txBody>
@@ -14850,7 +14777,7 @@
             </a:pPr>
             <a:r>
               <a:rPr lang="en-US" dirty="0"/>
-              <a:t>NTP - Network Time Protocol</a:t>
+              <a:t>Works with MAC address</a:t>
             </a:r>
           </a:p>
           <a:p>
@@ -14863,7 +14790,7 @@
             </a:pPr>
             <a:r>
               <a:rPr lang="en-US" dirty="0"/>
-              <a:t>Weather data</a:t>
+              <a:t>Need to know the our MAC and the Peer’s</a:t>
             </a:r>
           </a:p>
           <a:p>
@@ -14876,7 +14803,7 @@
             </a:pPr>
             <a:r>
               <a:rPr lang="en-US" dirty="0"/>
-              <a:t>Feeds (News, Sports and more)</a:t>
+              <a:t>Initialize the protocol</a:t>
             </a:r>
           </a:p>
           <a:p>
@@ -14889,7 +14816,98 @@
             </a:pPr>
             <a:r>
               <a:rPr lang="en-US" dirty="0"/>
-              <a:t>GEO location</a:t>
+              <a:t>Register callback functions for send and receive</a:t>
+            </a:r>
+          </a:p>
+          <a:p>
+            <a:pPr marL="285750" indent="-285750">
+              <a:spcBef>
+                <a:spcPts val="600"/>
+              </a:spcBef>
+              <a:buFont typeface="Arial" panose="020B0604020202020204" pitchFamily="34" charset="0"/>
+              <a:buChar char="•"/>
+            </a:pPr>
+            <a:r>
+              <a:rPr lang="en-US" dirty="0"/>
+              <a:t>Register peers</a:t>
+            </a:r>
+          </a:p>
+          <a:p>
+            <a:pPr marL="285750" indent="-285750">
+              <a:spcBef>
+                <a:spcPts val="600"/>
+              </a:spcBef>
+              <a:buFont typeface="Arial" panose="020B0604020202020204" pitchFamily="34" charset="0"/>
+              <a:buChar char="•"/>
+            </a:pPr>
+            <a:r>
+              <a:rPr lang="en-US" dirty="0"/>
+              <a:t>Upon sending the send function will be called:</a:t>
+            </a:r>
+          </a:p>
+          <a:p>
+            <a:pPr marL="511175" lvl="1" indent="-285750">
+              <a:spcBef>
+                <a:spcPts val="600"/>
+              </a:spcBef>
+              <a:buFont typeface="Arial" panose="020B0604020202020204" pitchFamily="34" charset="0"/>
+              <a:buChar char="•"/>
+            </a:pPr>
+            <a:r>
+              <a:rPr lang="en-US" dirty="0"/>
+              <a:t>With status</a:t>
+            </a:r>
+          </a:p>
+          <a:p>
+            <a:pPr marL="511175" lvl="1" indent="-285750">
+              <a:spcBef>
+                <a:spcPts val="600"/>
+              </a:spcBef>
+              <a:buFont typeface="Arial" panose="020B0604020202020204" pitchFamily="34" charset="0"/>
+              <a:buChar char="•"/>
+            </a:pPr>
+            <a:r>
+              <a:rPr lang="en-US" dirty="0"/>
+              <a:t>With the MAC of the targeted peer</a:t>
+            </a:r>
+          </a:p>
+          <a:p>
+            <a:pPr marL="285750" indent="-285750">
+              <a:spcBef>
+                <a:spcPts val="600"/>
+              </a:spcBef>
+              <a:buFont typeface="Arial" panose="020B0604020202020204" pitchFamily="34" charset="0"/>
+              <a:buChar char="•"/>
+            </a:pPr>
+            <a:r>
+              <a:rPr lang="en-US" dirty="0"/>
+              <a:t>Upon receiving the receive function will be called:</a:t>
+            </a:r>
+          </a:p>
+          <a:p>
+            <a:pPr marL="511175" lvl="1" indent="-285750">
+              <a:spcBef>
+                <a:spcPts val="600"/>
+              </a:spcBef>
+              <a:buFont typeface="Arial" panose="020B0604020202020204" pitchFamily="34" charset="0"/>
+              <a:buChar char="•"/>
+            </a:pPr>
+            <a:r>
+              <a:rPr lang="en-US" dirty="0"/>
+              <a:t>With the MAC of the sender</a:t>
+            </a:r>
+          </a:p>
+          <a:p>
+            <a:pPr marL="511175" lvl="1" indent="-285750">
+              <a:spcBef>
+                <a:spcPts val="600"/>
+              </a:spcBef>
+              <a:buFont typeface="Arial" panose="020B0604020202020204" pitchFamily="34" charset="0"/>
+              <a:buChar char="•"/>
+            </a:pPr>
+            <a:r>
+              <a:rPr lang="en-US" dirty="0"/>
+              <a:t>With the received data </a:t>
             </a:r>
           </a:p>
         </p:txBody>
@@ -14899,7 +14917,7 @@
           <p:cNvPr id="5" name="Picture 4">
             <a:extLst>
               <a:ext uri="{FF2B5EF4-FFF2-40B4-BE49-F238E27FC236}">
-                <a16:creationId xmlns:a16="http://schemas.microsoft.com/office/drawing/2014/main" id="{6A4E80F9-77F9-493E-95DC-442522D44FA5}"/>
+                <a16:creationId xmlns:a16="http://schemas.microsoft.com/office/drawing/2014/main" id="{E0CD740F-035D-419D-923E-4431F19446F0}"/>
               </a:ext>
             </a:extLst>
           </p:cNvPr>
@@ -14916,8 +14934,8 @@
         </p:blipFill>
         <p:spPr>
           <a:xfrm>
-            <a:off x="4164853" y="688731"/>
-            <a:ext cx="3880049" cy="482625"/>
+            <a:off x="5412371" y="416145"/>
+            <a:ext cx="2762392" cy="558829"/>
           </a:xfrm>
           <a:prstGeom prst="rect">
             <a:avLst/>
@@ -14939,7 +14957,7 @@
           <p:cNvPr id="6" name="Picture 5">
             <a:extLst>
               <a:ext uri="{FF2B5EF4-FFF2-40B4-BE49-F238E27FC236}">
-                <a16:creationId xmlns:a16="http://schemas.microsoft.com/office/drawing/2014/main" id="{02128C62-F3E6-48B7-B72B-5F4C087360FA}"/>
+                <a16:creationId xmlns:a16="http://schemas.microsoft.com/office/drawing/2014/main" id="{63A27537-E429-4EEC-8B70-DC7BEE487116}"/>
               </a:ext>
             </a:extLst>
           </p:cNvPr>
@@ -14956,8 +14974,8 @@
         </p:blipFill>
         <p:spPr>
           <a:xfrm>
-            <a:off x="3101266" y="1845899"/>
-            <a:ext cx="5651176" cy="611559"/>
+            <a:off x="5159771" y="1094540"/>
+            <a:ext cx="3425162" cy="541629"/>
           </a:xfrm>
           <a:prstGeom prst="rect">
             <a:avLst/>
@@ -14979,7 +14997,7 @@
           <p:cNvPr id="7" name="Picture 6">
             <a:extLst>
               <a:ext uri="{FF2B5EF4-FFF2-40B4-BE49-F238E27FC236}">
-                <a16:creationId xmlns:a16="http://schemas.microsoft.com/office/drawing/2014/main" id="{398027A8-F2FE-4F99-B672-3A620BFA9FDA}"/>
+                <a16:creationId xmlns:a16="http://schemas.microsoft.com/office/drawing/2014/main" id="{0EB74540-5EA9-4A02-8111-F55BC8B9176C}"/>
               </a:ext>
             </a:extLst>
           </p:cNvPr>
@@ -14996,8 +15014,8 @@
         </p:blipFill>
         <p:spPr>
           <a:xfrm>
-            <a:off x="4359697" y="2860855"/>
-            <a:ext cx="2762392" cy="647733"/>
+            <a:off x="5935289" y="1717892"/>
+            <a:ext cx="2239474" cy="595416"/>
           </a:xfrm>
           <a:prstGeom prst="rect">
             <a:avLst/>
@@ -15014,10 +15032,90 @@
           </a:effectLst>
         </p:spPr>
       </p:pic>
+      <p:pic>
+        <p:nvPicPr>
+          <p:cNvPr id="8" name="Picture 7">
+            <a:extLst>
+              <a:ext uri="{FF2B5EF4-FFF2-40B4-BE49-F238E27FC236}">
+                <a16:creationId xmlns:a16="http://schemas.microsoft.com/office/drawing/2014/main" id="{AF44AA83-D29E-4C69-BAF1-029E0D84F56B}"/>
+              </a:ext>
+            </a:extLst>
+          </p:cNvPr>
+          <p:cNvPicPr>
+            <a:picLocks noChangeAspect="1"/>
+          </p:cNvPicPr>
+          <p:nvPr/>
+        </p:nvPicPr>
+        <p:blipFill>
+          <a:blip r:embed="rId5"/>
+          <a:stretch>
+            <a:fillRect/>
+          </a:stretch>
+        </p:blipFill>
+        <p:spPr>
+          <a:xfrm>
+            <a:off x="5637320" y="2473262"/>
+            <a:ext cx="3181387" cy="516185"/>
+          </a:xfrm>
+          <a:prstGeom prst="rect">
+            <a:avLst/>
+          </a:prstGeom>
+          <a:ln>
+            <a:noFill/>
+          </a:ln>
+          <a:effectLst>
+            <a:outerShdw blurRad="292100" dist="139700" dir="2700000" algn="tl" rotWithShape="0">
+              <a:srgbClr val="333333">
+                <a:alpha val="65000"/>
+              </a:srgbClr>
+            </a:outerShdw>
+          </a:effectLst>
+        </p:spPr>
+      </p:pic>
+      <p:pic>
+        <p:nvPicPr>
+          <p:cNvPr id="9" name="Picture 8">
+            <a:extLst>
+              <a:ext uri="{FF2B5EF4-FFF2-40B4-BE49-F238E27FC236}">
+                <a16:creationId xmlns:a16="http://schemas.microsoft.com/office/drawing/2014/main" id="{9BDDAFFD-B164-44D2-98CC-ECE3EA8C8AEA}"/>
+              </a:ext>
+            </a:extLst>
+          </p:cNvPr>
+          <p:cNvPicPr>
+            <a:picLocks noChangeAspect="1"/>
+          </p:cNvPicPr>
+          <p:nvPr/>
+        </p:nvPicPr>
+        <p:blipFill>
+          <a:blip r:embed="rId6"/>
+          <a:stretch>
+            <a:fillRect/>
+          </a:stretch>
+        </p:blipFill>
+        <p:spPr>
+          <a:xfrm>
+            <a:off x="4500883" y="3938389"/>
+            <a:ext cx="3673880" cy="484878"/>
+          </a:xfrm>
+          <a:prstGeom prst="rect">
+            <a:avLst/>
+          </a:prstGeom>
+          <a:ln>
+            <a:noFill/>
+          </a:ln>
+          <a:effectLst>
+            <a:outerShdw blurRad="292100" dist="139700" dir="2700000" algn="tl" rotWithShape="0">
+              <a:srgbClr val="333333">
+                <a:alpha val="65000"/>
+              </a:srgbClr>
+            </a:outerShdw>
+          </a:effectLst>
+        </p:spPr>
+      </p:pic>
     </p:spTree>
     <p:extLst>
       <p:ext uri="{BB962C8B-B14F-4D97-AF65-F5344CB8AC3E}">
-        <p14:creationId xmlns:p14="http://schemas.microsoft.com/office/powerpoint/2010/main" val="1185005549"/>
+        <p14:creationId xmlns:p14="http://schemas.microsoft.com/office/powerpoint/2010/main" val="1910364947"/>
       </p:ext>
     </p:extLst>
   </p:cSld>
@@ -15082,6 +15180,315 @@
 </file>
 
 <file path=ppt/slides/slide20.xml><?xml version="1.0" encoding="utf-8"?>
+<p:sld xmlns:a="http://schemas.openxmlformats.org/drawingml/2006/main" xmlns:r="http://schemas.openxmlformats.org/officeDocument/2006/relationships" xmlns:p="http://schemas.openxmlformats.org/presentationml/2006/main">
+  <p:cSld>
+    <p:spTree>
+      <p:nvGrpSpPr>
+        <p:cNvPr id="1" name=""/>
+        <p:cNvGrpSpPr/>
+        <p:nvPr/>
+      </p:nvGrpSpPr>
+      <p:grpSpPr>
+        <a:xfrm>
+          <a:off x="0" y="0"/>
+          <a:ext cx="0" cy="0"/>
+          <a:chOff x="0" y="0"/>
+          <a:chExt cx="0" cy="0"/>
+        </a:xfrm>
+      </p:grpSpPr>
+      <p:sp>
+        <p:nvSpPr>
+          <p:cNvPr id="2" name="Slide Number Placeholder 1">
+            <a:extLst>
+              <a:ext uri="{FF2B5EF4-FFF2-40B4-BE49-F238E27FC236}">
+                <a16:creationId xmlns:a16="http://schemas.microsoft.com/office/drawing/2014/main" id="{17744C99-9A24-4D6F-8D3C-A4CB41E876CA}"/>
+              </a:ext>
+            </a:extLst>
+          </p:cNvPr>
+          <p:cNvSpPr>
+            <a:spLocks noGrp="1"/>
+          </p:cNvSpPr>
+          <p:nvPr>
+            <p:ph type="sldNum" sz="quarter" idx="12"/>
+          </p:nvPr>
+        </p:nvSpPr>
+        <p:spPr/>
+        <p:txBody>
+          <a:bodyPr/>
+          <a:lstStyle/>
+          <a:p>
+            <a:fld id="{EE2556C5-CE8C-6547-B838-EA80C61A4AF7}" type="slidenum">
+              <a:rPr lang="en-US" smtClean="0"/>
+              <a:pPr/>
+              <a:t>20</a:t>
+            </a:fld>
+            <a:endParaRPr lang="en-US" dirty="0"/>
+          </a:p>
+        </p:txBody>
+      </p:sp>
+      <p:sp>
+        <p:nvSpPr>
+          <p:cNvPr id="3" name="Title 2">
+            <a:extLst>
+              <a:ext uri="{FF2B5EF4-FFF2-40B4-BE49-F238E27FC236}">
+                <a16:creationId xmlns:a16="http://schemas.microsoft.com/office/drawing/2014/main" id="{DFCD3F10-262A-49AA-92F3-A28E2073C0CF}"/>
+              </a:ext>
+            </a:extLst>
+          </p:cNvPr>
+          <p:cNvSpPr>
+            <a:spLocks noGrp="1"/>
+          </p:cNvSpPr>
+          <p:nvPr>
+            <p:ph type="title"/>
+          </p:nvPr>
+        </p:nvSpPr>
+        <p:spPr>
+          <a:xfrm>
+            <a:off x="455613" y="308848"/>
+            <a:ext cx="8229600" cy="379883"/>
+          </a:xfrm>
+        </p:spPr>
+        <p:txBody>
+          <a:bodyPr/>
+          <a:lstStyle/>
+          <a:p>
+            <a:pPr>
+              <a:spcBef>
+                <a:spcPts val="600"/>
+              </a:spcBef>
+            </a:pPr>
+            <a:r>
+              <a:rPr lang="en-US" sz="3600" dirty="0"/>
+              <a:t>Useful web services </a:t>
+            </a:r>
+          </a:p>
+        </p:txBody>
+      </p:sp>
+      <p:sp>
+        <p:nvSpPr>
+          <p:cNvPr id="4" name="Content Placeholder 3">
+            <a:extLst>
+              <a:ext uri="{FF2B5EF4-FFF2-40B4-BE49-F238E27FC236}">
+                <a16:creationId xmlns:a16="http://schemas.microsoft.com/office/drawing/2014/main" id="{0DA5B5C6-365A-4798-8EE3-9AAC1659E9D7}"/>
+              </a:ext>
+            </a:extLst>
+          </p:cNvPr>
+          <p:cNvSpPr>
+            <a:spLocks noGrp="1"/>
+          </p:cNvSpPr>
+          <p:nvPr>
+            <p:ph sz="quarter" idx="13"/>
+          </p:nvPr>
+        </p:nvSpPr>
+        <p:spPr>
+          <a:xfrm>
+            <a:off x="455613" y="715109"/>
+            <a:ext cx="8228012" cy="3914042"/>
+          </a:xfrm>
+        </p:spPr>
+        <p:txBody>
+          <a:bodyPr/>
+          <a:lstStyle/>
+          <a:p>
+            <a:pPr marL="285750" indent="-285750">
+              <a:spcBef>
+                <a:spcPts val="600"/>
+              </a:spcBef>
+              <a:buFont typeface="Arial" panose="020B0604020202020204" pitchFamily="34" charset="0"/>
+              <a:buChar char="•"/>
+            </a:pPr>
+            <a:r>
+              <a:rPr lang="en-US" dirty="0"/>
+              <a:t>NTP - Network Time Protocol</a:t>
+            </a:r>
+          </a:p>
+          <a:p>
+            <a:pPr marL="285750" indent="-285750">
+              <a:spcBef>
+                <a:spcPts val="600"/>
+              </a:spcBef>
+              <a:buFont typeface="Arial" panose="020B0604020202020204" pitchFamily="34" charset="0"/>
+              <a:buChar char="•"/>
+            </a:pPr>
+            <a:r>
+              <a:rPr lang="en-US" dirty="0"/>
+              <a:t>Weather data</a:t>
+            </a:r>
+          </a:p>
+          <a:p>
+            <a:pPr marL="285750" indent="-285750">
+              <a:spcBef>
+                <a:spcPts val="600"/>
+              </a:spcBef>
+              <a:buFont typeface="Arial" panose="020B0604020202020204" pitchFamily="34" charset="0"/>
+              <a:buChar char="•"/>
+            </a:pPr>
+            <a:r>
+              <a:rPr lang="en-US" dirty="0"/>
+              <a:t>Feeds (News, Sports and more)</a:t>
+            </a:r>
+          </a:p>
+          <a:p>
+            <a:pPr marL="285750" indent="-285750">
+              <a:spcBef>
+                <a:spcPts val="600"/>
+              </a:spcBef>
+              <a:buFont typeface="Arial" panose="020B0604020202020204" pitchFamily="34" charset="0"/>
+              <a:buChar char="•"/>
+            </a:pPr>
+            <a:r>
+              <a:rPr lang="en-US" dirty="0"/>
+              <a:t>GEO location</a:t>
+            </a:r>
+          </a:p>
+        </p:txBody>
+      </p:sp>
+      <p:pic>
+        <p:nvPicPr>
+          <p:cNvPr id="5" name="Picture 4">
+            <a:extLst>
+              <a:ext uri="{FF2B5EF4-FFF2-40B4-BE49-F238E27FC236}">
+                <a16:creationId xmlns:a16="http://schemas.microsoft.com/office/drawing/2014/main" id="{6A4E80F9-77F9-493E-95DC-442522D44FA5}"/>
+              </a:ext>
+            </a:extLst>
+          </p:cNvPr>
+          <p:cNvPicPr>
+            <a:picLocks noChangeAspect="1"/>
+          </p:cNvPicPr>
+          <p:nvPr/>
+        </p:nvPicPr>
+        <p:blipFill>
+          <a:blip r:embed="rId2"/>
+          <a:stretch>
+            <a:fillRect/>
+          </a:stretch>
+        </p:blipFill>
+        <p:spPr>
+          <a:xfrm>
+            <a:off x="4164853" y="688731"/>
+            <a:ext cx="3880049" cy="482625"/>
+          </a:xfrm>
+          <a:prstGeom prst="rect">
+            <a:avLst/>
+          </a:prstGeom>
+          <a:ln>
+            <a:noFill/>
+          </a:ln>
+          <a:effectLst>
+            <a:outerShdw blurRad="292100" dist="139700" dir="2700000" algn="tl" rotWithShape="0">
+              <a:srgbClr val="333333">
+                <a:alpha val="65000"/>
+              </a:srgbClr>
+            </a:outerShdw>
+          </a:effectLst>
+        </p:spPr>
+      </p:pic>
+      <p:pic>
+        <p:nvPicPr>
+          <p:cNvPr id="6" name="Picture 5">
+            <a:extLst>
+              <a:ext uri="{FF2B5EF4-FFF2-40B4-BE49-F238E27FC236}">
+                <a16:creationId xmlns:a16="http://schemas.microsoft.com/office/drawing/2014/main" id="{02128C62-F3E6-48B7-B72B-5F4C087360FA}"/>
+              </a:ext>
+            </a:extLst>
+          </p:cNvPr>
+          <p:cNvPicPr>
+            <a:picLocks noChangeAspect="1"/>
+          </p:cNvPicPr>
+          <p:nvPr/>
+        </p:nvPicPr>
+        <p:blipFill>
+          <a:blip r:embed="rId3"/>
+          <a:stretch>
+            <a:fillRect/>
+          </a:stretch>
+        </p:blipFill>
+        <p:spPr>
+          <a:xfrm>
+            <a:off x="3101266" y="1845899"/>
+            <a:ext cx="5651176" cy="611559"/>
+          </a:xfrm>
+          <a:prstGeom prst="rect">
+            <a:avLst/>
+          </a:prstGeom>
+          <a:ln>
+            <a:noFill/>
+          </a:ln>
+          <a:effectLst>
+            <a:outerShdw blurRad="292100" dist="139700" dir="2700000" algn="tl" rotWithShape="0">
+              <a:srgbClr val="333333">
+                <a:alpha val="65000"/>
+              </a:srgbClr>
+            </a:outerShdw>
+          </a:effectLst>
+        </p:spPr>
+      </p:pic>
+      <p:pic>
+        <p:nvPicPr>
+          <p:cNvPr id="7" name="Picture 6">
+            <a:extLst>
+              <a:ext uri="{FF2B5EF4-FFF2-40B4-BE49-F238E27FC236}">
+                <a16:creationId xmlns:a16="http://schemas.microsoft.com/office/drawing/2014/main" id="{398027A8-F2FE-4F99-B672-3A620BFA9FDA}"/>
+              </a:ext>
+            </a:extLst>
+          </p:cNvPr>
+          <p:cNvPicPr>
+            <a:picLocks noChangeAspect="1"/>
+          </p:cNvPicPr>
+          <p:nvPr/>
+        </p:nvPicPr>
+        <p:blipFill>
+          <a:blip r:embed="rId4"/>
+          <a:stretch>
+            <a:fillRect/>
+          </a:stretch>
+        </p:blipFill>
+        <p:spPr>
+          <a:xfrm>
+            <a:off x="4359697" y="2860855"/>
+            <a:ext cx="2762392" cy="647733"/>
+          </a:xfrm>
+          <a:prstGeom prst="rect">
+            <a:avLst/>
+          </a:prstGeom>
+          <a:ln>
+            <a:noFill/>
+          </a:ln>
+          <a:effectLst>
+            <a:outerShdw blurRad="292100" dist="139700" dir="2700000" algn="tl" rotWithShape="0">
+              <a:srgbClr val="333333">
+                <a:alpha val="65000"/>
+              </a:srgbClr>
+            </a:outerShdw>
+          </a:effectLst>
+        </p:spPr>
+      </p:pic>
+    </p:spTree>
+    <p:extLst>
+      <p:ext uri="{BB962C8B-B14F-4D97-AF65-F5344CB8AC3E}">
+        <p14:creationId xmlns:p14="http://schemas.microsoft.com/office/powerpoint/2010/main" val="1185005549"/>
+      </p:ext>
+    </p:extLst>
+  </p:cSld>
+  <p:clrMapOvr>
+    <a:masterClrMapping/>
+  </p:clrMapOvr>
+  <mc:AlternateContent xmlns:mc="http://schemas.openxmlformats.org/markup-compatibility/2006" xmlns:p14="http://schemas.microsoft.com/office/powerpoint/2010/main">
+    <mc:Choice Requires="p14">
+      <p:transition spd="med" p14:dur="700">
+        <p:fade/>
+      </p:transition>
+    </mc:Choice>
+    <mc:Fallback xmlns="">
+      <p:transition spd="med">
+        <p:fade/>
+      </p:transition>
+    </mc:Fallback>
+  </mc:AlternateContent>
+</p:sld>
+</file>
+
+<file path=ppt/slides/slide21.xml><?xml version="1.0" encoding="utf-8"?>
 <p:sld xmlns:a="http://schemas.openxmlformats.org/drawingml/2006/main" xmlns:r="http://schemas.openxmlformats.org/officeDocument/2006/relationships" xmlns:p="http://schemas.openxmlformats.org/presentationml/2006/main">
   <p:cSld>
     <p:spTree>

</xml_diff>